<commit_message>
minor edits to pptx figures
</commit_message>
<xml_diff>
--- a/extraMaterials/xray_setup_diagram.pptx
+++ b/extraMaterials/xray_setup_diagram.pptx
@@ -6,6 +6,7 @@
   </p:sldMasterIdLst>
   <p:sldIdLst>
     <p:sldId id="256" r:id="rId2"/>
+    <p:sldId id="257" r:id="rId3"/>
   </p:sldIdLst>
   <p:sldSz cx="12192000" cy="6858000"/>
   <p:notesSz cx="6858000" cy="9144000"/>
@@ -104,6 +105,11 @@
       </a:defRPr>
     </a:lvl9pPr>
   </p:defaultTextStyle>
+  <p:extLst>
+    <p:ext uri="{EFAFB233-063F-42B5-8137-9DF3F51BA10A}">
+      <p15:sldGuideLst xmlns:p15="http://schemas.microsoft.com/office/powerpoint/2012/main"/>
+    </p:ext>
+  </p:extLst>
 </p:presentation>
 </file>
 
@@ -266,7 +272,7 @@
           <a:p>
             <a:fld id="{6CEBC259-6B1A-4666-AC99-5A7B6A65C355}" type="datetimeFigureOut">
               <a:rPr lang="en-US" smtClean="0"/>
-              <a:t>8/8/2021</a:t>
+              <a:t>9/29/2021</a:t>
             </a:fld>
             <a:endParaRPr lang="en-US"/>
           </a:p>
@@ -464,7 +470,7 @@
           <a:p>
             <a:fld id="{6CEBC259-6B1A-4666-AC99-5A7B6A65C355}" type="datetimeFigureOut">
               <a:rPr lang="en-US" smtClean="0"/>
-              <a:t>8/8/2021</a:t>
+              <a:t>9/29/2021</a:t>
             </a:fld>
             <a:endParaRPr lang="en-US"/>
           </a:p>
@@ -672,7 +678,7 @@
           <a:p>
             <a:fld id="{6CEBC259-6B1A-4666-AC99-5A7B6A65C355}" type="datetimeFigureOut">
               <a:rPr lang="en-US" smtClean="0"/>
-              <a:t>8/8/2021</a:t>
+              <a:t>9/29/2021</a:t>
             </a:fld>
             <a:endParaRPr lang="en-US"/>
           </a:p>
@@ -870,7 +876,7 @@
           <a:p>
             <a:fld id="{6CEBC259-6B1A-4666-AC99-5A7B6A65C355}" type="datetimeFigureOut">
               <a:rPr lang="en-US" smtClean="0"/>
-              <a:t>8/8/2021</a:t>
+              <a:t>9/29/2021</a:t>
             </a:fld>
             <a:endParaRPr lang="en-US"/>
           </a:p>
@@ -1145,7 +1151,7 @@
           <a:p>
             <a:fld id="{6CEBC259-6B1A-4666-AC99-5A7B6A65C355}" type="datetimeFigureOut">
               <a:rPr lang="en-US" smtClean="0"/>
-              <a:t>8/8/2021</a:t>
+              <a:t>9/29/2021</a:t>
             </a:fld>
             <a:endParaRPr lang="en-US"/>
           </a:p>
@@ -1410,7 +1416,7 @@
           <a:p>
             <a:fld id="{6CEBC259-6B1A-4666-AC99-5A7B6A65C355}" type="datetimeFigureOut">
               <a:rPr lang="en-US" smtClean="0"/>
-              <a:t>8/8/2021</a:t>
+              <a:t>9/29/2021</a:t>
             </a:fld>
             <a:endParaRPr lang="en-US"/>
           </a:p>
@@ -1822,7 +1828,7 @@
           <a:p>
             <a:fld id="{6CEBC259-6B1A-4666-AC99-5A7B6A65C355}" type="datetimeFigureOut">
               <a:rPr lang="en-US" smtClean="0"/>
-              <a:t>8/8/2021</a:t>
+              <a:t>9/29/2021</a:t>
             </a:fld>
             <a:endParaRPr lang="en-US"/>
           </a:p>
@@ -1963,7 +1969,7 @@
           <a:p>
             <a:fld id="{6CEBC259-6B1A-4666-AC99-5A7B6A65C355}" type="datetimeFigureOut">
               <a:rPr lang="en-US" smtClean="0"/>
-              <a:t>8/8/2021</a:t>
+              <a:t>9/29/2021</a:t>
             </a:fld>
             <a:endParaRPr lang="en-US"/>
           </a:p>
@@ -2076,7 +2082,7 @@
           <a:p>
             <a:fld id="{6CEBC259-6B1A-4666-AC99-5A7B6A65C355}" type="datetimeFigureOut">
               <a:rPr lang="en-US" smtClean="0"/>
-              <a:t>8/8/2021</a:t>
+              <a:t>9/29/2021</a:t>
             </a:fld>
             <a:endParaRPr lang="en-US"/>
           </a:p>
@@ -2387,7 +2393,7 @@
           <a:p>
             <a:fld id="{6CEBC259-6B1A-4666-AC99-5A7B6A65C355}" type="datetimeFigureOut">
               <a:rPr lang="en-US" smtClean="0"/>
-              <a:t>8/8/2021</a:t>
+              <a:t>9/29/2021</a:t>
             </a:fld>
             <a:endParaRPr lang="en-US"/>
           </a:p>
@@ -2675,7 +2681,7 @@
           <a:p>
             <a:fld id="{6CEBC259-6B1A-4666-AC99-5A7B6A65C355}" type="datetimeFigureOut">
               <a:rPr lang="en-US" smtClean="0"/>
-              <a:t>8/8/2021</a:t>
+              <a:t>9/29/2021</a:t>
             </a:fld>
             <a:endParaRPr lang="en-US"/>
           </a:p>
@@ -2916,7 +2922,7 @@
           <a:p>
             <a:fld id="{6CEBC259-6B1A-4666-AC99-5A7B6A65C355}" type="datetimeFigureOut">
               <a:rPr lang="en-US" smtClean="0"/>
-              <a:t>8/8/2021</a:t>
+              <a:t>9/29/2021</a:t>
             </a:fld>
             <a:endParaRPr lang="en-US"/>
           </a:p>
@@ -3973,6 +3979,445 @@
 </p:sld>
 </file>
 
+<file path=ppt/slides/slide2.xml><?xml version="1.0" encoding="utf-8"?>
+<p:sld xmlns:a="http://schemas.openxmlformats.org/drawingml/2006/main" xmlns:r="http://schemas.openxmlformats.org/officeDocument/2006/relationships" xmlns:p="http://schemas.openxmlformats.org/presentationml/2006/main">
+  <p:cSld>
+    <p:spTree>
+      <p:nvGrpSpPr>
+        <p:cNvPr id="1" name=""/>
+        <p:cNvGrpSpPr/>
+        <p:nvPr/>
+      </p:nvGrpSpPr>
+      <p:grpSpPr>
+        <a:xfrm>
+          <a:off x="0" y="0"/>
+          <a:ext cx="0" cy="0"/>
+          <a:chOff x="0" y="0"/>
+          <a:chExt cx="0" cy="0"/>
+        </a:xfrm>
+      </p:grpSpPr>
+      <p:pic>
+        <p:nvPicPr>
+          <p:cNvPr id="4" name="Picture 3" descr="A picture containing engineering drawing&#10;&#10;Description automatically generated">
+            <a:extLst>
+              <a:ext uri="{FF2B5EF4-FFF2-40B4-BE49-F238E27FC236}">
+                <a16:creationId xmlns:a16="http://schemas.microsoft.com/office/drawing/2014/main" id="{29AF54A8-449E-481D-BA41-DBF0336CAC8D}"/>
+              </a:ext>
+            </a:extLst>
+          </p:cNvPr>
+          <p:cNvPicPr>
+            <a:picLocks noChangeAspect="1"/>
+          </p:cNvPicPr>
+          <p:nvPr/>
+        </p:nvPicPr>
+        <p:blipFill rotWithShape="1">
+          <a:blip r:embed="rId2">
+            <a:extLst>
+              <a:ext uri="{28A0092B-C50C-407E-A947-70E740481C1C}">
+                <a14:useLocalDpi xmlns:a14="http://schemas.microsoft.com/office/drawing/2010/main" val="0"/>
+              </a:ext>
+            </a:extLst>
+          </a:blip>
+          <a:srcRect l="794" t="1594" r="51197" b="40916"/>
+          <a:stretch/>
+        </p:blipFill>
+        <p:spPr>
+          <a:xfrm>
+            <a:off x="4550735" y="707362"/>
+            <a:ext cx="3142502" cy="4082300"/>
+          </a:xfrm>
+          <a:prstGeom prst="rect">
+            <a:avLst/>
+          </a:prstGeom>
+        </p:spPr>
+      </p:pic>
+      <p:cxnSp>
+        <p:nvCxnSpPr>
+          <p:cNvPr id="17" name="Straight Arrow Connector 16">
+            <a:extLst>
+              <a:ext uri="{FF2B5EF4-FFF2-40B4-BE49-F238E27FC236}">
+                <a16:creationId xmlns:a16="http://schemas.microsoft.com/office/drawing/2014/main" id="{F4FACE73-367D-4235-BDC8-B337058329F9}"/>
+              </a:ext>
+            </a:extLst>
+          </p:cNvPr>
+          <p:cNvCxnSpPr>
+            <a:cxnSpLocks/>
+            <a:stCxn id="2" idx="1"/>
+          </p:cNvCxnSpPr>
+          <p:nvPr/>
+        </p:nvCxnSpPr>
+        <p:spPr>
+          <a:xfrm flipH="1">
+            <a:off x="5768502" y="879573"/>
+            <a:ext cx="838778" cy="302218"/>
+          </a:xfrm>
+          <a:prstGeom prst="straightConnector1">
+            <a:avLst/>
+          </a:prstGeom>
+          <a:ln w="19050">
+            <a:solidFill>
+              <a:schemeClr val="bg1"/>
+            </a:solidFill>
+            <a:tailEnd type="triangle"/>
+          </a:ln>
+        </p:spPr>
+        <p:style>
+          <a:lnRef idx="1">
+            <a:schemeClr val="accent1"/>
+          </a:lnRef>
+          <a:fillRef idx="0">
+            <a:schemeClr val="accent1"/>
+          </a:fillRef>
+          <a:effectRef idx="0">
+            <a:schemeClr val="accent1"/>
+          </a:effectRef>
+          <a:fontRef idx="minor">
+            <a:schemeClr val="tx1"/>
+          </a:fontRef>
+        </p:style>
+      </p:cxnSp>
+      <p:cxnSp>
+        <p:nvCxnSpPr>
+          <p:cNvPr id="23" name="Straight Arrow Connector 22">
+            <a:extLst>
+              <a:ext uri="{FF2B5EF4-FFF2-40B4-BE49-F238E27FC236}">
+                <a16:creationId xmlns:a16="http://schemas.microsoft.com/office/drawing/2014/main" id="{A6883676-B503-4DAE-AE6A-7351FE2E3AC6}"/>
+              </a:ext>
+            </a:extLst>
+          </p:cNvPr>
+          <p:cNvCxnSpPr>
+            <a:cxnSpLocks/>
+            <a:stCxn id="16" idx="2"/>
+          </p:cNvCxnSpPr>
+          <p:nvPr/>
+        </p:nvCxnSpPr>
+        <p:spPr>
+          <a:xfrm flipH="1">
+            <a:off x="5683956" y="1892862"/>
+            <a:ext cx="1409744" cy="1459286"/>
+          </a:xfrm>
+          <a:prstGeom prst="straightConnector1">
+            <a:avLst/>
+          </a:prstGeom>
+          <a:ln w="19050">
+            <a:solidFill>
+              <a:schemeClr val="bg1"/>
+            </a:solidFill>
+            <a:tailEnd type="triangle"/>
+          </a:ln>
+        </p:spPr>
+        <p:style>
+          <a:lnRef idx="1">
+            <a:schemeClr val="accent1"/>
+          </a:lnRef>
+          <a:fillRef idx="0">
+            <a:schemeClr val="accent1"/>
+          </a:fillRef>
+          <a:effectRef idx="0">
+            <a:schemeClr val="accent1"/>
+          </a:effectRef>
+          <a:fontRef idx="minor">
+            <a:schemeClr val="tx1"/>
+          </a:fontRef>
+        </p:style>
+      </p:cxnSp>
+      <p:cxnSp>
+        <p:nvCxnSpPr>
+          <p:cNvPr id="25" name="Straight Arrow Connector 24">
+            <a:extLst>
+              <a:ext uri="{FF2B5EF4-FFF2-40B4-BE49-F238E27FC236}">
+                <a16:creationId xmlns:a16="http://schemas.microsoft.com/office/drawing/2014/main" id="{6D480285-73F9-4279-AE7D-C9B87F68F77E}"/>
+              </a:ext>
+            </a:extLst>
+          </p:cNvPr>
+          <p:cNvCxnSpPr>
+            <a:cxnSpLocks/>
+            <a:stCxn id="20" idx="1"/>
+          </p:cNvCxnSpPr>
+          <p:nvPr/>
+        </p:nvCxnSpPr>
+        <p:spPr>
+          <a:xfrm flipH="1">
+            <a:off x="6213529" y="2920527"/>
+            <a:ext cx="525566" cy="585326"/>
+          </a:xfrm>
+          <a:prstGeom prst="straightConnector1">
+            <a:avLst/>
+          </a:prstGeom>
+          <a:ln w="19050">
+            <a:solidFill>
+              <a:schemeClr val="bg1"/>
+            </a:solidFill>
+            <a:tailEnd type="triangle"/>
+          </a:ln>
+        </p:spPr>
+        <p:style>
+          <a:lnRef idx="1">
+            <a:schemeClr val="accent1"/>
+          </a:lnRef>
+          <a:fillRef idx="0">
+            <a:schemeClr val="accent1"/>
+          </a:fillRef>
+          <a:effectRef idx="0">
+            <a:schemeClr val="accent1"/>
+          </a:effectRef>
+          <a:fontRef idx="minor">
+            <a:schemeClr val="tx1"/>
+          </a:fontRef>
+        </p:style>
+      </p:cxnSp>
+      <p:cxnSp>
+        <p:nvCxnSpPr>
+          <p:cNvPr id="27" name="Straight Arrow Connector 26">
+            <a:extLst>
+              <a:ext uri="{FF2B5EF4-FFF2-40B4-BE49-F238E27FC236}">
+                <a16:creationId xmlns:a16="http://schemas.microsoft.com/office/drawing/2014/main" id="{3E8E9BDA-9475-4878-97F7-88CE0B2BA53A}"/>
+              </a:ext>
+            </a:extLst>
+          </p:cNvPr>
+          <p:cNvCxnSpPr>
+            <a:cxnSpLocks/>
+            <a:stCxn id="24" idx="1"/>
+          </p:cNvCxnSpPr>
+          <p:nvPr/>
+        </p:nvCxnSpPr>
+        <p:spPr>
+          <a:xfrm flipH="1" flipV="1">
+            <a:off x="6187891" y="4063219"/>
+            <a:ext cx="324004" cy="320500"/>
+          </a:xfrm>
+          <a:prstGeom prst="straightConnector1">
+            <a:avLst/>
+          </a:prstGeom>
+          <a:ln w="19050">
+            <a:solidFill>
+              <a:schemeClr val="bg1"/>
+            </a:solidFill>
+            <a:tailEnd type="triangle"/>
+          </a:ln>
+        </p:spPr>
+        <p:style>
+          <a:lnRef idx="1">
+            <a:schemeClr val="accent1"/>
+          </a:lnRef>
+          <a:fillRef idx="0">
+            <a:schemeClr val="accent1"/>
+          </a:fillRef>
+          <a:effectRef idx="0">
+            <a:schemeClr val="accent1"/>
+          </a:effectRef>
+          <a:fontRef idx="minor">
+            <a:schemeClr val="tx1"/>
+          </a:fontRef>
+        </p:style>
+      </p:cxnSp>
+      <p:sp>
+        <p:nvSpPr>
+          <p:cNvPr id="2" name="TextBox 1">
+            <a:extLst>
+              <a:ext uri="{FF2B5EF4-FFF2-40B4-BE49-F238E27FC236}">
+                <a16:creationId xmlns:a16="http://schemas.microsoft.com/office/drawing/2014/main" id="{71B8BFAC-A2CD-4E19-9C14-1B1E6FE62F4F}"/>
+              </a:ext>
+            </a:extLst>
+          </p:cNvPr>
+          <p:cNvSpPr txBox="1"/>
+          <p:nvPr/>
+        </p:nvSpPr>
+        <p:spPr>
+          <a:xfrm>
+            <a:off x="6607280" y="725684"/>
+            <a:ext cx="1068225" cy="307777"/>
+          </a:xfrm>
+          <a:prstGeom prst="rect">
+            <a:avLst/>
+          </a:prstGeom>
+          <a:solidFill>
+            <a:schemeClr val="bg1"/>
+          </a:solidFill>
+        </p:spPr>
+        <p:txBody>
+          <a:bodyPr wrap="square" rtlCol="0">
+            <a:spAutoFit/>
+          </a:bodyPr>
+          <a:lstStyle/>
+          <a:p>
+            <a:pPr algn="ctr"/>
+            <a:r>
+              <a:rPr lang="en-US" sz="1400" dirty="0"/>
+              <a:t>X-ray gun</a:t>
+            </a:r>
+          </a:p>
+        </p:txBody>
+      </p:sp>
+      <p:sp>
+        <p:nvSpPr>
+          <p:cNvPr id="16" name="TextBox 15">
+            <a:extLst>
+              <a:ext uri="{FF2B5EF4-FFF2-40B4-BE49-F238E27FC236}">
+                <a16:creationId xmlns:a16="http://schemas.microsoft.com/office/drawing/2014/main" id="{591409EB-3557-42B0-90B7-80F73A43EB33}"/>
+              </a:ext>
+            </a:extLst>
+          </p:cNvPr>
+          <p:cNvSpPr txBox="1"/>
+          <p:nvPr/>
+        </p:nvSpPr>
+        <p:spPr>
+          <a:xfrm>
+            <a:off x="6511895" y="1585085"/>
+            <a:ext cx="1163609" cy="307777"/>
+          </a:xfrm>
+          <a:prstGeom prst="rect">
+            <a:avLst/>
+          </a:prstGeom>
+          <a:solidFill>
+            <a:schemeClr val="bg1"/>
+          </a:solidFill>
+        </p:spPr>
+        <p:txBody>
+          <a:bodyPr wrap="square" rtlCol="0">
+            <a:spAutoFit/>
+          </a:bodyPr>
+          <a:lstStyle/>
+          <a:p>
+            <a:pPr algn="ctr"/>
+            <a:r>
+              <a:rPr lang="en-US" sz="1400" dirty="0"/>
+              <a:t>Brass holder</a:t>
+            </a:r>
+          </a:p>
+        </p:txBody>
+      </p:sp>
+      <p:sp>
+        <p:nvSpPr>
+          <p:cNvPr id="20" name="TextBox 19">
+            <a:extLst>
+              <a:ext uri="{FF2B5EF4-FFF2-40B4-BE49-F238E27FC236}">
+                <a16:creationId xmlns:a16="http://schemas.microsoft.com/office/drawing/2014/main" id="{4FD30075-377C-4F9E-A734-A6C3FE555D16}"/>
+              </a:ext>
+            </a:extLst>
+          </p:cNvPr>
+          <p:cNvSpPr txBox="1"/>
+          <p:nvPr/>
+        </p:nvSpPr>
+        <p:spPr>
+          <a:xfrm>
+            <a:off x="6739095" y="2658917"/>
+            <a:ext cx="939064" cy="523220"/>
+          </a:xfrm>
+          <a:prstGeom prst="rect">
+            <a:avLst/>
+          </a:prstGeom>
+          <a:solidFill>
+            <a:schemeClr val="bg1"/>
+          </a:solidFill>
+        </p:spPr>
+        <p:txBody>
+          <a:bodyPr wrap="square" rtlCol="0">
+            <a:spAutoFit/>
+          </a:bodyPr>
+          <a:lstStyle/>
+          <a:p>
+            <a:pPr algn="ctr"/>
+            <a:r>
+              <a:rPr lang="en-US" sz="1400" dirty="0"/>
+              <a:t>Mounting plate</a:t>
+            </a:r>
+          </a:p>
+        </p:txBody>
+      </p:sp>
+      <p:sp>
+        <p:nvSpPr>
+          <p:cNvPr id="24" name="TextBox 23">
+            <a:extLst>
+              <a:ext uri="{FF2B5EF4-FFF2-40B4-BE49-F238E27FC236}">
+                <a16:creationId xmlns:a16="http://schemas.microsoft.com/office/drawing/2014/main" id="{C3566B8C-4E99-42D4-81CD-1039E4AE4D82}"/>
+              </a:ext>
+            </a:extLst>
+          </p:cNvPr>
+          <p:cNvSpPr txBox="1"/>
+          <p:nvPr/>
+        </p:nvSpPr>
+        <p:spPr>
+          <a:xfrm>
+            <a:off x="6511895" y="4014387"/>
+            <a:ext cx="1163609" cy="738664"/>
+          </a:xfrm>
+          <a:prstGeom prst="rect">
+            <a:avLst/>
+          </a:prstGeom>
+          <a:solidFill>
+            <a:schemeClr val="bg1"/>
+          </a:solidFill>
+        </p:spPr>
+        <p:txBody>
+          <a:bodyPr wrap="square" rtlCol="0">
+            <a:spAutoFit/>
+          </a:bodyPr>
+          <a:lstStyle/>
+          <a:p>
+            <a:pPr algn="ctr"/>
+            <a:r>
+              <a:rPr lang="en-US" sz="1400" dirty="0"/>
+              <a:t>Alignment platform (underneath)</a:t>
+            </a:r>
+          </a:p>
+        </p:txBody>
+      </p:sp>
+      <p:sp>
+        <p:nvSpPr>
+          <p:cNvPr id="26" name="TextBox 25">
+            <a:extLst>
+              <a:ext uri="{FF2B5EF4-FFF2-40B4-BE49-F238E27FC236}">
+                <a16:creationId xmlns:a16="http://schemas.microsoft.com/office/drawing/2014/main" id="{2F8018D0-28ED-4E4F-AFA1-756AFC43BE20}"/>
+              </a:ext>
+            </a:extLst>
+          </p:cNvPr>
+          <p:cNvSpPr txBox="1"/>
+          <p:nvPr/>
+        </p:nvSpPr>
+        <p:spPr>
+          <a:xfrm>
+            <a:off x="4576372" y="4444087"/>
+            <a:ext cx="1637157" cy="307777"/>
+          </a:xfrm>
+          <a:prstGeom prst="rect">
+            <a:avLst/>
+          </a:prstGeom>
+          <a:solidFill>
+            <a:schemeClr val="bg1"/>
+          </a:solidFill>
+        </p:spPr>
+        <p:txBody>
+          <a:bodyPr wrap="square" rtlCol="0">
+            <a:spAutoFit/>
+          </a:bodyPr>
+          <a:lstStyle/>
+          <a:p>
+            <a:pPr algn="ctr"/>
+            <a:r>
+              <a:rPr lang="en-US" sz="1400" dirty="0" err="1"/>
+              <a:t>sTGC</a:t>
+            </a:r>
+            <a:r>
+              <a:rPr lang="en-US" sz="1400" dirty="0"/>
+              <a:t> wedge surface</a:t>
+            </a:r>
+          </a:p>
+        </p:txBody>
+      </p:sp>
+    </p:spTree>
+    <p:extLst>
+      <p:ext uri="{BB962C8B-B14F-4D97-AF65-F5344CB8AC3E}">
+        <p14:creationId xmlns:p14="http://schemas.microsoft.com/office/powerpoint/2010/main" val="2293493304"/>
+      </p:ext>
+    </p:extLst>
+  </p:cSld>
+  <p:clrMapOvr>
+    <a:masterClrMapping/>
+  </p:clrMapOvr>
+</p:sld>
+</file>
+
 <file path=ppt/theme/theme1.xml><?xml version="1.0" encoding="utf-8"?>
 <a:theme xmlns:a="http://schemas.openxmlformats.org/drawingml/2006/main" name="Office Theme">
   <a:themeElements>

</xml_diff>